<commit_message>
Updated TODO and Kinect AR doc
</commit_message>
<xml_diff>
--- a/docs/KINECT_AR.pptx
+++ b/docs/KINECT_AR.pptx
@@ -301,7 +301,7 @@
             <a:fld id="{C0EECAF8-E807-445D-A296-F70F18CF7437}" type="datetimeFigureOut">
               <a:rPr lang="en-GB" smtClean="0"/>
               <a:pPr/>
-              <a:t>16/05/2019</a:t>
+              <a:t>11/06/2019</a:t>
             </a:fld>
             <a:endParaRPr lang="en-GB"/>
           </a:p>
@@ -468,7 +468,7 @@
             <a:fld id="{C0EECAF8-E807-445D-A296-F70F18CF7437}" type="datetimeFigureOut">
               <a:rPr lang="en-GB" smtClean="0"/>
               <a:pPr/>
-              <a:t>16/05/2019</a:t>
+              <a:t>11/06/2019</a:t>
             </a:fld>
             <a:endParaRPr lang="en-GB"/>
           </a:p>
@@ -645,7 +645,7 @@
             <a:fld id="{C0EECAF8-E807-445D-A296-F70F18CF7437}" type="datetimeFigureOut">
               <a:rPr lang="en-GB" smtClean="0"/>
               <a:pPr/>
-              <a:t>16/05/2019</a:t>
+              <a:t>11/06/2019</a:t>
             </a:fld>
             <a:endParaRPr lang="en-GB"/>
           </a:p>
@@ -812,7 +812,7 @@
             <a:fld id="{C0EECAF8-E807-445D-A296-F70F18CF7437}" type="datetimeFigureOut">
               <a:rPr lang="en-GB" smtClean="0"/>
               <a:pPr/>
-              <a:t>16/05/2019</a:t>
+              <a:t>11/06/2019</a:t>
             </a:fld>
             <a:endParaRPr lang="en-GB"/>
           </a:p>
@@ -1055,7 +1055,7 @@
             <a:fld id="{C0EECAF8-E807-445D-A296-F70F18CF7437}" type="datetimeFigureOut">
               <a:rPr lang="en-GB" smtClean="0"/>
               <a:pPr/>
-              <a:t>16/05/2019</a:t>
+              <a:t>11/06/2019</a:t>
             </a:fld>
             <a:endParaRPr lang="en-GB"/>
           </a:p>
@@ -1340,7 +1340,7 @@
             <a:fld id="{C0EECAF8-E807-445D-A296-F70F18CF7437}" type="datetimeFigureOut">
               <a:rPr lang="en-GB" smtClean="0"/>
               <a:pPr/>
-              <a:t>16/05/2019</a:t>
+              <a:t>11/06/2019</a:t>
             </a:fld>
             <a:endParaRPr lang="en-GB"/>
           </a:p>
@@ -1759,7 +1759,7 @@
             <a:fld id="{C0EECAF8-E807-445D-A296-F70F18CF7437}" type="datetimeFigureOut">
               <a:rPr lang="en-GB" smtClean="0"/>
               <a:pPr/>
-              <a:t>16/05/2019</a:t>
+              <a:t>11/06/2019</a:t>
             </a:fld>
             <a:endParaRPr lang="en-GB"/>
           </a:p>
@@ -1874,7 +1874,7 @@
             <a:fld id="{C0EECAF8-E807-445D-A296-F70F18CF7437}" type="datetimeFigureOut">
               <a:rPr lang="en-GB" smtClean="0"/>
               <a:pPr/>
-              <a:t>16/05/2019</a:t>
+              <a:t>11/06/2019</a:t>
             </a:fld>
             <a:endParaRPr lang="en-GB"/>
           </a:p>
@@ -1966,7 +1966,7 @@
             <a:fld id="{C0EECAF8-E807-445D-A296-F70F18CF7437}" type="datetimeFigureOut">
               <a:rPr lang="en-GB" smtClean="0"/>
               <a:pPr/>
-              <a:t>16/05/2019</a:t>
+              <a:t>11/06/2019</a:t>
             </a:fld>
             <a:endParaRPr lang="en-GB"/>
           </a:p>
@@ -2240,7 +2240,7 @@
             <a:fld id="{C0EECAF8-E807-445D-A296-F70F18CF7437}" type="datetimeFigureOut">
               <a:rPr lang="en-GB" smtClean="0"/>
               <a:pPr/>
-              <a:t>16/05/2019</a:t>
+              <a:t>11/06/2019</a:t>
             </a:fld>
             <a:endParaRPr lang="en-GB"/>
           </a:p>
@@ -2490,7 +2490,7 @@
             <a:fld id="{C0EECAF8-E807-445D-A296-F70F18CF7437}" type="datetimeFigureOut">
               <a:rPr lang="en-GB" smtClean="0"/>
               <a:pPr/>
-              <a:t>16/05/2019</a:t>
+              <a:t>11/06/2019</a:t>
             </a:fld>
             <a:endParaRPr lang="en-GB"/>
           </a:p>
@@ -2700,7 +2700,7 @@
             <a:fld id="{C0EECAF8-E807-445D-A296-F70F18CF7437}" type="datetimeFigureOut">
               <a:rPr lang="en-GB" smtClean="0"/>
               <a:pPr/>
-              <a:t>16/05/2019</a:t>
+              <a:t>11/06/2019</a:t>
             </a:fld>
             <a:endParaRPr lang="en-GB"/>
           </a:p>
@@ -4036,8 +4036,8 @@
         </p:blipFill>
         <p:spPr>
           <a:xfrm>
-            <a:off x="1187624" y="4338959"/>
-            <a:ext cx="2045637" cy="2042369"/>
+            <a:off x="4499992" y="1844824"/>
+            <a:ext cx="1153972" cy="1152128"/>
           </a:xfrm>
           <a:prstGeom prst="rect">
             <a:avLst/>
@@ -4060,8 +4060,8 @@
         </p:blipFill>
         <p:spPr>
           <a:xfrm>
-            <a:off x="3539238" y="4338959"/>
-            <a:ext cx="2040874" cy="2040874"/>
+            <a:off x="5724128" y="1844824"/>
+            <a:ext cx="1151285" cy="1151285"/>
           </a:xfrm>
           <a:prstGeom prst="rect">
             <a:avLst/>
@@ -4084,8 +4084,8 @@
         </p:blipFill>
         <p:spPr>
           <a:xfrm>
-            <a:off x="5915502" y="4338959"/>
-            <a:ext cx="2040874" cy="2040874"/>
+            <a:off x="6949107" y="1844824"/>
+            <a:ext cx="1151285" cy="1151285"/>
           </a:xfrm>
           <a:prstGeom prst="rect">
             <a:avLst/>
@@ -4135,6 +4135,54 @@
           </a:p>
         </p:txBody>
       </p:sp>
+      <p:pic>
+        <p:nvPicPr>
+          <p:cNvPr id="9" name="Image 8" descr="android_gyro_axis.png"/>
+          <p:cNvPicPr>
+            <a:picLocks noChangeAspect="1"/>
+          </p:cNvPicPr>
+          <p:nvPr/>
+        </p:nvPicPr>
+        <p:blipFill>
+          <a:blip r:embed="rId5" cstate="print"/>
+          <a:stretch>
+            <a:fillRect/>
+          </a:stretch>
+        </p:blipFill>
+        <p:spPr>
+          <a:xfrm>
+            <a:off x="2123728" y="4725144"/>
+            <a:ext cx="1367163" cy="1349127"/>
+          </a:xfrm>
+          <a:prstGeom prst="rect">
+            <a:avLst/>
+          </a:prstGeom>
+        </p:spPr>
+      </p:pic>
+      <p:pic>
+        <p:nvPicPr>
+          <p:cNvPr id="10" name="Image 9" descr="unity_axis.png"/>
+          <p:cNvPicPr>
+            <a:picLocks noChangeAspect="1"/>
+          </p:cNvPicPr>
+          <p:nvPr/>
+        </p:nvPicPr>
+        <p:blipFill>
+          <a:blip r:embed="rId6" cstate="print"/>
+          <a:stretch>
+            <a:fillRect/>
+          </a:stretch>
+        </p:blipFill>
+        <p:spPr>
+          <a:xfrm>
+            <a:off x="4572000" y="4797152"/>
+            <a:ext cx="1792934" cy="1271180"/>
+          </a:xfrm>
+          <a:prstGeom prst="rect">
+            <a:avLst/>
+          </a:prstGeom>
+        </p:spPr>
+      </p:pic>
     </p:spTree>
   </p:cSld>
   <p:clrMapOvr>
@@ -4176,7 +4224,7 @@
         <p:spPr>
           <a:xfrm>
             <a:off x="899592" y="1052736"/>
-            <a:ext cx="4182620" cy="2308324"/>
+            <a:ext cx="6537687" cy="2308324"/>
           </a:xfrm>
           <a:prstGeom prst="rect">
             <a:avLst/>
@@ -4188,6 +4236,16 @@
             <a:spAutoFit/>
           </a:bodyPr>
           <a:lstStyle/>
+          <a:p>
+            <a:r>
+              <a:rPr lang="en-GB" dirty="0" smtClean="0"/>
+              <a:t>TODO!</a:t>
+            </a:r>
+            <a:endParaRPr lang="en-GB" dirty="0" err="1" smtClean="0"/>
+          </a:p>
+          <a:p>
+            <a:endParaRPr lang="en-GB" dirty="0" smtClean="0"/>
+          </a:p>
           <a:p>
             <a:pPr>
               <a:buFontTx/>
@@ -4195,16 +4253,43 @@
             </a:pPr>
             <a:r>
               <a:rPr lang="en-GB" dirty="0" smtClean="0"/>
-              <a:t> ... TODO!</a:t>
+              <a:t> </a:t>
+            </a:r>
+            <a:r>
+              <a:rPr lang="en-GB" dirty="0" smtClean="0"/>
+              <a:t>Hand tracking</a:t>
             </a:r>
           </a:p>
           <a:p>
             <a:pPr lvl="1"/>
             <a:r>
               <a:rPr lang="en-GB" dirty="0" smtClean="0"/>
-              <a:t>=&gt; ...</a:t>
-            </a:r>
-            <a:endParaRPr lang="en-GB" dirty="0" err="1" smtClean="0"/>
+              <a:t>=&gt; </a:t>
+            </a:r>
+            <a:r>
+              <a:rPr lang="en-GB" dirty="0" smtClean="0"/>
+              <a:t>Using </a:t>
+            </a:r>
+            <a:r>
+              <a:rPr lang="en-GB" dirty="0" err="1" smtClean="0"/>
+              <a:t>Kinect</a:t>
+            </a:r>
+            <a:r>
+              <a:rPr lang="en-GB" dirty="0" smtClean="0"/>
+              <a:t> body frames</a:t>
+            </a:r>
+          </a:p>
+          <a:p>
+            <a:pPr lvl="1"/>
+            <a:r>
+              <a:rPr lang="en-GB" dirty="0" smtClean="0"/>
+              <a:t>! – Tr</a:t>
+            </a:r>
+            <a:r>
+              <a:rPr lang="en-GB" dirty="0" smtClean="0"/>
+              <a:t>acking struggle when hands in front of body!</a:t>
+            </a:r>
+            <a:endParaRPr lang="en-GB" dirty="0" smtClean="0"/>
           </a:p>
           <a:p>
             <a:endParaRPr lang="en-GB" dirty="0" smtClean="0"/>
@@ -4216,33 +4301,12 @@
             </a:pPr>
             <a:r>
               <a:rPr lang="en-GB" dirty="0" smtClean="0"/>
-              <a:t> Player holds a paddle</a:t>
-            </a:r>
-          </a:p>
-          <a:p>
-            <a:pPr lvl="1">
-              <a:buFontTx/>
-              <a:buChar char="-"/>
-            </a:pPr>
-            <a:r>
-              <a:rPr lang="en-GB" dirty="0" smtClean="0"/>
-              <a:t> Coloured cardboard</a:t>
-            </a:r>
-          </a:p>
-          <a:p>
-            <a:pPr lvl="1">
-              <a:buFontTx/>
-              <a:buChar char="-"/>
-            </a:pPr>
-            <a:r>
-              <a:rPr lang="en-GB" dirty="0" smtClean="0"/>
-              <a:t> 2 handed</a:t>
-            </a:r>
-          </a:p>
-          <a:p>
+              <a:t> Could hold coloured devices to allow different types of interactions</a:t>
+            </a:r>
             <a:endParaRPr lang="en-GB" dirty="0" smtClean="0"/>
           </a:p>
           <a:p>
+            <a:pPr lvl="1"/>
             <a:r>
               <a:rPr lang="en-GB" dirty="0" smtClean="0"/>
               <a:t>=&gt; Colour tracking with </a:t>
@@ -4253,7 +4317,7 @@
             </a:r>
             <a:r>
               <a:rPr lang="en-GB" dirty="0" smtClean="0"/>
-              <a:t> (+</a:t>
+              <a:t> RGB image (using </a:t>
             </a:r>
             <a:r>
               <a:rPr lang="en-GB" dirty="0" err="1" smtClean="0"/>
@@ -4263,6 +4327,7 @@
               <a:rPr lang="en-GB" dirty="0" smtClean="0"/>
               <a:t>?)</a:t>
             </a:r>
+            <a:endParaRPr lang="en-GB" dirty="0" smtClean="0"/>
           </a:p>
         </p:txBody>
       </p:sp>
@@ -8255,11 +8320,7 @@
             <a:pPr lvl="1"/>
             <a:r>
               <a:rPr lang="en-GB" dirty="0" smtClean="0"/>
-              <a:t>	=&gt; Same “up” &amp; </a:t>
-            </a:r>
-            <a:r>
-              <a:rPr lang="en-GB" dirty="0" smtClean="0"/>
-              <a:t>“right” vectors (not “forward”</a:t>
+              <a:t>	=&gt; Same “up” &amp; “right” vectors (not “forward”</a:t>
             </a:r>
             <a:r>
               <a:rPr lang="en-GB" dirty="0" smtClean="0">
@@ -8273,7 +8334,6 @@
               <a:rPr lang="en-GB" dirty="0" smtClean="0"/>
               <a:t>)</a:t>
             </a:r>
-            <a:endParaRPr lang="en-GB" dirty="0" smtClean="0"/>
           </a:p>
           <a:p>
             <a:pPr lvl="3">
@@ -8330,15 +8390,7 @@
                   <a:srgbClr val="FF0000"/>
                 </a:solidFill>
               </a:rPr>
-              <a:t>(</a:t>
-            </a:r>
-            <a:r>
-              <a:rPr lang="en-GB" smtClean="0">
-                <a:solidFill>
-                  <a:srgbClr val="FF0000"/>
-                </a:solidFill>
-              </a:rPr>
-              <a:t>REMOVE/ADJUST </a:t>
+              <a:t>(REMOVE/ADJUST </a:t>
             </a:r>
             <a:r>
               <a:rPr lang="en-GB" dirty="0" smtClean="0">
@@ -8505,11 +8557,7 @@
           <a:p>
             <a:r>
               <a:rPr lang="en-GB" dirty="0" smtClean="0"/>
-              <a:t>	- X = </a:t>
-            </a:r>
-            <a:r>
-              <a:rPr lang="en-GB" dirty="0" smtClean="0"/>
-              <a:t>0.0</a:t>
+              <a:t>	- X = 0.0</a:t>
             </a:r>
             <a:endParaRPr lang="en-GB" dirty="0" smtClean="0">
               <a:solidFill>
@@ -8540,11 +8588,7 @@
           <a:p>
             <a:r>
               <a:rPr lang="en-GB" dirty="0" smtClean="0"/>
-              <a:t>	- </a:t>
-            </a:r>
-            <a:r>
-              <a:rPr lang="en-GB" dirty="0" smtClean="0"/>
-              <a:t>Z</a:t>
+              <a:t>	- Z</a:t>
             </a:r>
             <a:r>
               <a:rPr lang="en-GB" dirty="0" smtClean="0">
@@ -8556,11 +8600,7 @@
             </a:r>
             <a:r>
               <a:rPr lang="en-GB" dirty="0" smtClean="0"/>
-              <a:t> </a:t>
-            </a:r>
-            <a:r>
-              <a:rPr lang="en-GB" dirty="0" smtClean="0"/>
-              <a:t>= 3.0 (meters) – (ideal)</a:t>
+              <a:t> = 3.0 (meters) – (ideal)</a:t>
             </a:r>
           </a:p>
           <a:p>
@@ -9325,7 +9365,15 @@
             </a:r>
             <a:r>
               <a:rPr lang="en-GB" dirty="0" smtClean="0"/>
-              <a:t>X = 0.0 (unless camera not centred!)</a:t>
+              <a:t>X = 0.0 (unless camera not </a:t>
+            </a:r>
+            <a:r>
+              <a:rPr lang="en-GB" dirty="0" err="1" smtClean="0"/>
+              <a:t>centered</a:t>
+            </a:r>
+            <a:r>
+              <a:rPr lang="en-GB" dirty="0" smtClean="0"/>
+              <a:t>!)</a:t>
             </a:r>
           </a:p>
           <a:p>

</xml_diff>

<commit_message>
Added Kinect colour tracking initial info
</commit_message>
<xml_diff>
--- a/docs/KINECT_AR.pptx
+++ b/docs/KINECT_AR.pptx
@@ -3095,8 +3095,9 @@
           <a:p>
             <a:r>
               <a:rPr lang="en-GB" sz="4000" b="1" dirty="0" smtClean="0"/>
-              <a:t>RAD</a:t>
-            </a:r>
+              <a:t>KINECT AR</a:t>
+            </a:r>
+            <a:endParaRPr lang="en-GB" sz="4000" b="1" dirty="0" smtClean="0"/>
           </a:p>
           <a:p>
             <a:r>
@@ -4253,22 +4254,14 @@
             </a:pPr>
             <a:r>
               <a:rPr lang="en-GB" dirty="0" smtClean="0"/>
-              <a:t> </a:t>
-            </a:r>
-            <a:r>
-              <a:rPr lang="en-GB" dirty="0" smtClean="0"/>
-              <a:t>Hand tracking</a:t>
+              <a:t> Hand tracking</a:t>
             </a:r>
           </a:p>
           <a:p>
             <a:pPr lvl="1"/>
             <a:r>
               <a:rPr lang="en-GB" dirty="0" smtClean="0"/>
-              <a:t>=&gt; </a:t>
-            </a:r>
-            <a:r>
-              <a:rPr lang="en-GB" dirty="0" smtClean="0"/>
-              <a:t>Using </a:t>
+              <a:t>=&gt; Using </a:t>
             </a:r>
             <a:r>
               <a:rPr lang="en-GB" dirty="0" err="1" smtClean="0"/>
@@ -4283,13 +4276,8 @@
             <a:pPr lvl="1"/>
             <a:r>
               <a:rPr lang="en-GB" dirty="0" smtClean="0"/>
-              <a:t>! – Tr</a:t>
-            </a:r>
-            <a:r>
-              <a:rPr lang="en-GB" dirty="0" smtClean="0"/>
-              <a:t>acking struggle when hands in front of body!</a:t>
-            </a:r>
-            <a:endParaRPr lang="en-GB" dirty="0" smtClean="0"/>
+              <a:t>! – Tracking struggle when hands in front of body!</a:t>
+            </a:r>
           </a:p>
           <a:p>
             <a:endParaRPr lang="en-GB" dirty="0" smtClean="0"/>
@@ -4303,7 +4291,6 @@
               <a:rPr lang="en-GB" dirty="0" smtClean="0"/>
               <a:t> Could hold coloured devices to allow different types of interactions</a:t>
             </a:r>
-            <a:endParaRPr lang="en-GB" dirty="0" smtClean="0"/>
           </a:p>
           <a:p>
             <a:pPr lvl="1"/>
@@ -4327,7 +4314,6 @@
               <a:rPr lang="en-GB" dirty="0" smtClean="0"/>
               <a:t>?)</a:t>
             </a:r>
-            <a:endParaRPr lang="en-GB" dirty="0" smtClean="0"/>
           </a:p>
         </p:txBody>
       </p:sp>

</xml_diff>